<commit_message>
Update template notebook and plotting functions
</commit_message>
<xml_diff>
--- a/workflow/workflow.pptx
+++ b/workflow/workflow.pptx
@@ -107,6 +107,11 @@
       </a:defRPr>
     </a:lvl9pPr>
   </p:defaultTextStyle>
+  <p:extLst>
+    <p:ext uri="{EFAFB233-063F-42B5-8137-9DF3F51BA10A}">
+      <p15:sldGuideLst xmlns:p15="http://schemas.microsoft.com/office/powerpoint/2012/main"/>
+    </p:ext>
+  </p:extLst>
 </p:presentation>
 </file>
 
@@ -192,7 +197,7 @@
           <a:p>
             <a:fld id="{B545E27F-EF40-C34E-AD08-16C8EC7ECB9E}" type="datetimeFigureOut">
               <a:rPr lang="en-US" smtClean="0"/>
-              <a:t>7/24/24</a:t>
+              <a:t>7/27/24</a:t>
             </a:fld>
             <a:endParaRPr lang="en-US"/>
           </a:p>
@@ -679,7 +684,7 @@
           <a:p>
             <a:fld id="{C9676780-A533-C945-BE25-F1C220B38E7A}" type="datetimeFigureOut">
               <a:rPr lang="en-US" smtClean="0"/>
-              <a:t>7/24/24</a:t>
+              <a:t>7/27/24</a:t>
             </a:fld>
             <a:endParaRPr lang="en-US"/>
           </a:p>
@@ -849,7 +854,7 @@
           <a:p>
             <a:fld id="{C9676780-A533-C945-BE25-F1C220B38E7A}" type="datetimeFigureOut">
               <a:rPr lang="en-US" smtClean="0"/>
-              <a:t>7/24/24</a:t>
+              <a:t>7/27/24</a:t>
             </a:fld>
             <a:endParaRPr lang="en-US"/>
           </a:p>
@@ -1029,7 +1034,7 @@
           <a:p>
             <a:fld id="{C9676780-A533-C945-BE25-F1C220B38E7A}" type="datetimeFigureOut">
               <a:rPr lang="en-US" smtClean="0"/>
-              <a:t>7/24/24</a:t>
+              <a:t>7/27/24</a:t>
             </a:fld>
             <a:endParaRPr lang="en-US"/>
           </a:p>
@@ -1199,7 +1204,7 @@
           <a:p>
             <a:fld id="{C9676780-A533-C945-BE25-F1C220B38E7A}" type="datetimeFigureOut">
               <a:rPr lang="en-US" smtClean="0"/>
-              <a:t>7/24/24</a:t>
+              <a:t>7/27/24</a:t>
             </a:fld>
             <a:endParaRPr lang="en-US"/>
           </a:p>
@@ -1445,7 +1450,7 @@
           <a:p>
             <a:fld id="{C9676780-A533-C945-BE25-F1C220B38E7A}" type="datetimeFigureOut">
               <a:rPr lang="en-US" smtClean="0"/>
-              <a:t>7/24/24</a:t>
+              <a:t>7/27/24</a:t>
             </a:fld>
             <a:endParaRPr lang="en-US"/>
           </a:p>
@@ -1677,7 +1682,7 @@
           <a:p>
             <a:fld id="{C9676780-A533-C945-BE25-F1C220B38E7A}" type="datetimeFigureOut">
               <a:rPr lang="en-US" smtClean="0"/>
-              <a:t>7/24/24</a:t>
+              <a:t>7/27/24</a:t>
             </a:fld>
             <a:endParaRPr lang="en-US"/>
           </a:p>
@@ -2044,7 +2049,7 @@
           <a:p>
             <a:fld id="{C9676780-A533-C945-BE25-F1C220B38E7A}" type="datetimeFigureOut">
               <a:rPr lang="en-US" smtClean="0"/>
-              <a:t>7/24/24</a:t>
+              <a:t>7/27/24</a:t>
             </a:fld>
             <a:endParaRPr lang="en-US"/>
           </a:p>
@@ -2162,7 +2167,7 @@
           <a:p>
             <a:fld id="{C9676780-A533-C945-BE25-F1C220B38E7A}" type="datetimeFigureOut">
               <a:rPr lang="en-US" smtClean="0"/>
-              <a:t>7/24/24</a:t>
+              <a:t>7/27/24</a:t>
             </a:fld>
             <a:endParaRPr lang="en-US"/>
           </a:p>
@@ -2257,7 +2262,7 @@
           <a:p>
             <a:fld id="{C9676780-A533-C945-BE25-F1C220B38E7A}" type="datetimeFigureOut">
               <a:rPr lang="en-US" smtClean="0"/>
-              <a:t>7/24/24</a:t>
+              <a:t>7/27/24</a:t>
             </a:fld>
             <a:endParaRPr lang="en-US"/>
           </a:p>
@@ -2534,7 +2539,7 @@
           <a:p>
             <a:fld id="{C9676780-A533-C945-BE25-F1C220B38E7A}" type="datetimeFigureOut">
               <a:rPr lang="en-US" smtClean="0"/>
-              <a:t>7/24/24</a:t>
+              <a:t>7/27/24</a:t>
             </a:fld>
             <a:endParaRPr lang="en-US"/>
           </a:p>
@@ -2791,7 +2796,7 @@
           <a:p>
             <a:fld id="{C9676780-A533-C945-BE25-F1C220B38E7A}" type="datetimeFigureOut">
               <a:rPr lang="en-US" smtClean="0"/>
-              <a:t>7/24/24</a:t>
+              <a:t>7/27/24</a:t>
             </a:fld>
             <a:endParaRPr lang="en-US"/>
           </a:p>
@@ -3004,7 +3009,7 @@
           <a:p>
             <a:fld id="{C9676780-A533-C945-BE25-F1C220B38E7A}" type="datetimeFigureOut">
               <a:rPr lang="en-US" smtClean="0"/>
-              <a:t>7/24/24</a:t>
+              <a:t>7/27/24</a:t>
             </a:fld>
             <a:endParaRPr lang="en-US"/>
           </a:p>
@@ -4359,74 +4364,6 @@
       </p:sp>
       <p:sp>
         <p:nvSpPr>
-          <p:cNvPr id="39" name="TextBox 38">
-            <a:extLst>
-              <a:ext uri="{FF2B5EF4-FFF2-40B4-BE49-F238E27FC236}">
-                <a16:creationId xmlns:a16="http://schemas.microsoft.com/office/drawing/2014/main" id="{D6877ABE-FBA1-8395-E29C-2C2355C988C3}"/>
-              </a:ext>
-            </a:extLst>
-          </p:cNvPr>
-          <p:cNvSpPr txBox="1"/>
-          <p:nvPr/>
-        </p:nvSpPr>
-        <p:spPr>
-          <a:xfrm>
-            <a:off x="2746273" y="3437954"/>
-            <a:ext cx="2343177" cy="646331"/>
-          </a:xfrm>
-          <a:prstGeom prst="rect">
-            <a:avLst/>
-          </a:prstGeom>
-          <a:noFill/>
-        </p:spPr>
-        <p:txBody>
-          <a:bodyPr wrap="square" rtlCol="0">
-            <a:spAutoFit/>
-          </a:bodyPr>
-          <a:lstStyle/>
-          <a:p>
-            <a:endParaRPr lang="en-US" sz="900" i="1" dirty="0">
-              <a:latin typeface="Arial" panose="020B0604020202020204" pitchFamily="34" charset="0"/>
-              <a:cs typeface="Arial" panose="020B0604020202020204" pitchFamily="34" charset="0"/>
-            </a:endParaRPr>
-          </a:p>
-          <a:p>
-            <a:r>
-              <a:rPr lang="en-US" sz="800" dirty="0" err="1">
-                <a:solidFill>
-                  <a:srgbClr val="000000"/>
-                </a:solidFill>
-                <a:highlight>
-                  <a:srgbClr val="FFFFFF"/>
-                </a:highlight>
-                <a:latin typeface="Menlo" panose="020B0609030804020204" pitchFamily="49" charset="0"/>
-                <a:ea typeface="Menlo" panose="020B0609030804020204" pitchFamily="49" charset="0"/>
-                <a:cs typeface="Menlo" panose="020B0609030804020204" pitchFamily="49" charset="0"/>
-              </a:rPr>
-              <a:t>tfr_regression</a:t>
-            </a:r>
-            <a:r>
-              <a:rPr lang="en-US" sz="800" dirty="0">
-                <a:latin typeface="Menlo" panose="020B0609030804020204" pitchFamily="49" charset="0"/>
-                <a:ea typeface="Menlo" panose="020B0609030804020204" pitchFamily="49" charset="0"/>
-                <a:cs typeface="Menlo" panose="020B0609030804020204" pitchFamily="49" charset="0"/>
-              </a:rPr>
-              <a:t>()</a:t>
-            </a:r>
-          </a:p>
-          <a:p>
-            <a:endParaRPr lang="en-US" sz="900" dirty="0">
-              <a:latin typeface="Arial" panose="020B0604020202020204" pitchFamily="34" charset="0"/>
-              <a:cs typeface="Arial" panose="020B0604020202020204" pitchFamily="34" charset="0"/>
-            </a:endParaRPr>
-          </a:p>
-          <a:p>
-            <a:endParaRPr lang="en-US" sz="900" dirty="0"/>
-          </a:p>
-        </p:txBody>
-      </p:sp>
-      <p:sp>
-        <p:nvSpPr>
           <p:cNvPr id="40" name="TextBox 39">
             <a:extLst>
               <a:ext uri="{FF2B5EF4-FFF2-40B4-BE49-F238E27FC236}">
@@ -5072,6 +5009,59 @@
           </a:p>
           <a:p>
             <a:endParaRPr lang="en-US" dirty="0"/>
+          </a:p>
+        </p:txBody>
+      </p:sp>
+      <p:sp>
+        <p:nvSpPr>
+          <p:cNvPr id="2" name="TextBox 1">
+            <a:extLst>
+              <a:ext uri="{FF2B5EF4-FFF2-40B4-BE49-F238E27FC236}">
+                <a16:creationId xmlns:a16="http://schemas.microsoft.com/office/drawing/2014/main" id="{3D2832FC-32E5-DCA6-52D1-0EFC68100200}"/>
+              </a:ext>
+            </a:extLst>
+          </p:cNvPr>
+          <p:cNvSpPr txBox="1"/>
+          <p:nvPr/>
+        </p:nvSpPr>
+        <p:spPr>
+          <a:xfrm>
+            <a:off x="2746273" y="3437954"/>
+            <a:ext cx="1200645" cy="215444"/>
+          </a:xfrm>
+          <a:prstGeom prst="rect">
+            <a:avLst/>
+          </a:prstGeom>
+          <a:noFill/>
+        </p:spPr>
+        <p:txBody>
+          <a:bodyPr wrap="square" rtlCol="0">
+            <a:spAutoFit/>
+          </a:bodyPr>
+          <a:lstStyle/>
+          <a:p>
+            <a:r>
+              <a:rPr lang="en-US" sz="800" dirty="0" err="1">
+                <a:solidFill>
+                  <a:srgbClr val="000000"/>
+                </a:solidFill>
+                <a:highlight>
+                  <a:srgbClr val="FFFFFF"/>
+                </a:highlight>
+                <a:latin typeface="Menlo" panose="020B0609030804020204" pitchFamily="49" charset="0"/>
+                <a:ea typeface="Menlo" panose="020B0609030804020204" pitchFamily="49" charset="0"/>
+                <a:cs typeface="Menlo" panose="020B0609030804020204" pitchFamily="49" charset="0"/>
+              </a:rPr>
+              <a:t>tfr_regression</a:t>
+            </a:r>
+            <a:r>
+              <a:rPr lang="en-US" sz="800" dirty="0">
+                <a:latin typeface="Menlo" panose="020B0609030804020204" pitchFamily="49" charset="0"/>
+                <a:ea typeface="Menlo" panose="020B0609030804020204" pitchFamily="49" charset="0"/>
+                <a:cs typeface="Menlo" panose="020B0609030804020204" pitchFamily="49" charset="0"/>
+              </a:rPr>
+              <a:t>()</a:t>
+            </a:r>
           </a:p>
         </p:txBody>
       </p:sp>

</xml_diff>